<commit_message>
working on part b changed a bunch of stuff
</commit_message>
<xml_diff>
--- a/Presentation.pptx
+++ b/Presentation.pptx
@@ -5,7 +5,7 @@
     <p:sldMasterId id="2147483648" r:id="rId1"/>
   </p:sldMasterIdLst>
   <p:notesMasterIdLst>
-    <p:notesMasterId r:id="rId9"/>
+    <p:notesMasterId r:id="rId11"/>
   </p:notesMasterIdLst>
   <p:sldIdLst>
     <p:sldId id="256" r:id="rId2"/>
@@ -15,6 +15,8 @@
     <p:sldId id="260" r:id="rId6"/>
     <p:sldId id="262" r:id="rId7"/>
     <p:sldId id="261" r:id="rId8"/>
+    <p:sldId id="263" r:id="rId9"/>
+    <p:sldId id="264" r:id="rId10"/>
   </p:sldIdLst>
   <p:sldSz cx="12192000" cy="6858000"/>
   <p:notesSz cx="6858000" cy="9144000"/>
@@ -113,6 +115,11 @@
       </a:defRPr>
     </a:lvl9pPr>
   </p:defaultTextStyle>
+  <p:extLst>
+    <p:ext uri="{EFAFB233-063F-42B5-8137-9DF3F51BA10A}">
+      <p15:sldGuideLst xmlns:p15="http://schemas.microsoft.com/office/powerpoint/2012/main"/>
+    </p:ext>
+  </p:extLst>
 </p:presentation>
 </file>
 
@@ -4536,7 +4543,6 @@
               <a:rPr lang="en-US" dirty="0" smtClean="0"/>
               <a:t> (online)</a:t>
             </a:r>
-            <a:endParaRPr lang="en-US" dirty="0" smtClean="0"/>
           </a:p>
         </p:txBody>
       </p:sp>
@@ -4589,7 +4595,6 @@
               <a:rPr lang="en-US" dirty="0" smtClean="0"/>
               <a:t> (online)</a:t>
             </a:r>
-            <a:endParaRPr lang="en-US" dirty="0" smtClean="0"/>
           </a:p>
         </p:txBody>
       </p:sp>
@@ -4931,11 +4936,7 @@
             <a:pPr algn="ctr"/>
             <a:r>
               <a:rPr lang="en-US" dirty="0" err="1" smtClean="0"/>
-              <a:t>full</a:t>
-            </a:r>
-            <a:r>
-              <a:rPr lang="en-US" dirty="0" err="1" smtClean="0"/>
-              <a:t>_syndrome.m</a:t>
+              <a:t>full_syndrome.m</a:t>
             </a:r>
             <a:endParaRPr lang="en-US" dirty="0" smtClean="0"/>
           </a:p>
@@ -5194,7 +5195,6 @@
               <a:rPr lang="en-US" dirty="0" smtClean="0"/>
               <a:t> (online)</a:t>
             </a:r>
-            <a:endParaRPr lang="en-US" dirty="0" smtClean="0"/>
           </a:p>
         </p:txBody>
       </p:sp>
@@ -5833,11 +5833,7 @@
             <a:pPr algn="ctr"/>
             <a:r>
               <a:rPr lang="en-US" dirty="0" err="1" smtClean="0"/>
-              <a:t>full</a:t>
-            </a:r>
-            <a:r>
-              <a:rPr lang="en-US" dirty="0" err="1" smtClean="0"/>
-              <a:t>_syndrome.m</a:t>
+              <a:t>full_syndrome.m</a:t>
             </a:r>
             <a:endParaRPr lang="en-US" dirty="0" smtClean="0"/>
           </a:p>
@@ -6257,7 +6253,6 @@
               <a:rPr lang="en-US" dirty="0" smtClean="0"/>
               <a:t> (online)</a:t>
             </a:r>
-            <a:endParaRPr lang="en-US" dirty="0" smtClean="0"/>
           </a:p>
         </p:txBody>
       </p:sp>
@@ -6330,6 +6325,164 @@
       </p:par>
     </p:tnLst>
   </p:timing>
+</p:sld>
+</file>
+
+<file path=ppt/slides/slide8.xml><?xml version="1.0" encoding="utf-8"?>
+<p:sld xmlns:a="http://schemas.openxmlformats.org/drawingml/2006/main" xmlns:r="http://schemas.openxmlformats.org/officeDocument/2006/relationships" xmlns:p="http://schemas.openxmlformats.org/presentationml/2006/main">
+  <p:cSld>
+    <p:spTree>
+      <p:nvGrpSpPr>
+        <p:cNvPr id="1" name=""/>
+        <p:cNvGrpSpPr/>
+        <p:nvPr/>
+      </p:nvGrpSpPr>
+      <p:grpSpPr>
+        <a:xfrm>
+          <a:off x="0" y="0"/>
+          <a:ext cx="0" cy="0"/>
+          <a:chOff x="0" y="0"/>
+          <a:chExt cx="0" cy="0"/>
+        </a:xfrm>
+      </p:grpSpPr>
+      <p:sp>
+        <p:nvSpPr>
+          <p:cNvPr id="2" name="Title 1"/>
+          <p:cNvSpPr>
+            <a:spLocks noGrp="1"/>
+          </p:cNvSpPr>
+          <p:nvPr>
+            <p:ph type="title"/>
+          </p:nvPr>
+        </p:nvSpPr>
+        <p:spPr/>
+        <p:txBody>
+          <a:bodyPr/>
+          <a:lstStyle/>
+          <a:p>
+            <a:r>
+              <a:rPr lang="en-US" dirty="0" smtClean="0"/>
+              <a:t>Part A</a:t>
+            </a:r>
+            <a:endParaRPr lang="en-US" dirty="0"/>
+          </a:p>
+        </p:txBody>
+      </p:sp>
+      <p:pic>
+        <p:nvPicPr>
+          <p:cNvPr id="4" name="Content Placeholder 3"/>
+          <p:cNvPicPr>
+            <a:picLocks noGrp="1" noChangeAspect="1"/>
+          </p:cNvPicPr>
+          <p:nvPr>
+            <p:ph idx="1"/>
+          </p:nvPr>
+        </p:nvPicPr>
+        <p:blipFill>
+          <a:blip r:embed="rId2"/>
+          <a:stretch>
+            <a:fillRect/>
+          </a:stretch>
+        </p:blipFill>
+        <p:spPr>
+          <a:xfrm>
+            <a:off x="3576804" y="1825625"/>
+            <a:ext cx="5038391" cy="4351338"/>
+          </a:xfrm>
+          <a:prstGeom prst="rect">
+            <a:avLst/>
+          </a:prstGeom>
+        </p:spPr>
+      </p:pic>
+    </p:spTree>
+    <p:extLst>
+      <p:ext uri="{BB962C8B-B14F-4D97-AF65-F5344CB8AC3E}">
+        <p14:creationId xmlns:p14="http://schemas.microsoft.com/office/powerpoint/2010/main" val="529409462"/>
+      </p:ext>
+    </p:extLst>
+  </p:cSld>
+  <p:clrMapOvr>
+    <a:masterClrMapping/>
+  </p:clrMapOvr>
+</p:sld>
+</file>
+
+<file path=ppt/slides/slide9.xml><?xml version="1.0" encoding="utf-8"?>
+<p:sld xmlns:a="http://schemas.openxmlformats.org/drawingml/2006/main" xmlns:r="http://schemas.openxmlformats.org/officeDocument/2006/relationships" xmlns:p="http://schemas.openxmlformats.org/presentationml/2006/main">
+  <p:cSld>
+    <p:spTree>
+      <p:nvGrpSpPr>
+        <p:cNvPr id="1" name=""/>
+        <p:cNvGrpSpPr/>
+        <p:nvPr/>
+      </p:nvGrpSpPr>
+      <p:grpSpPr>
+        <a:xfrm>
+          <a:off x="0" y="0"/>
+          <a:ext cx="0" cy="0"/>
+          <a:chOff x="0" y="0"/>
+          <a:chExt cx="0" cy="0"/>
+        </a:xfrm>
+      </p:grpSpPr>
+      <p:sp>
+        <p:nvSpPr>
+          <p:cNvPr id="2" name="Title 1"/>
+          <p:cNvSpPr>
+            <a:spLocks noGrp="1"/>
+          </p:cNvSpPr>
+          <p:nvPr>
+            <p:ph type="title"/>
+          </p:nvPr>
+        </p:nvSpPr>
+        <p:spPr/>
+        <p:txBody>
+          <a:bodyPr/>
+          <a:lstStyle/>
+          <a:p>
+            <a:r>
+              <a:rPr lang="en-US" dirty="0" smtClean="0"/>
+              <a:t>Part B</a:t>
+            </a:r>
+            <a:endParaRPr lang="en-US" dirty="0"/>
+          </a:p>
+        </p:txBody>
+      </p:sp>
+      <p:pic>
+        <p:nvPicPr>
+          <p:cNvPr id="4" name="Content Placeholder 3"/>
+          <p:cNvPicPr>
+            <a:picLocks noGrp="1" noChangeAspect="1"/>
+          </p:cNvPicPr>
+          <p:nvPr>
+            <p:ph idx="1"/>
+          </p:nvPr>
+        </p:nvPicPr>
+        <p:blipFill>
+          <a:blip r:embed="rId2"/>
+          <a:stretch>
+            <a:fillRect/>
+          </a:stretch>
+        </p:blipFill>
+        <p:spPr>
+          <a:xfrm>
+            <a:off x="3804809" y="1825625"/>
+            <a:ext cx="4582382" cy="4351338"/>
+          </a:xfrm>
+          <a:prstGeom prst="rect">
+            <a:avLst/>
+          </a:prstGeom>
+        </p:spPr>
+      </p:pic>
+    </p:spTree>
+    <p:extLst>
+      <p:ext uri="{BB962C8B-B14F-4D97-AF65-F5344CB8AC3E}">
+        <p14:creationId xmlns:p14="http://schemas.microsoft.com/office/powerpoint/2010/main" val="933184510"/>
+      </p:ext>
+    </p:extLst>
+  </p:cSld>
+  <p:clrMapOvr>
+    <a:masterClrMapping/>
+  </p:clrMapOvr>
 </p:sld>
 </file>
 

</xml_diff>